<commit_message>
Preza i jos testova
</commit_message>
<xml_diff>
--- a/docs/LDCF.pptx
+++ b/docs/LDCF.pptx
@@ -14,10 +14,12 @@
     <p:sldId id="271" r:id="rId8"/>
     <p:sldId id="264" r:id="rId9"/>
     <p:sldId id="265" r:id="rId10"/>
-    <p:sldId id="266" r:id="rId11"/>
-    <p:sldId id="267" r:id="rId12"/>
-    <p:sldId id="268" r:id="rId13"/>
-    <p:sldId id="272" r:id="rId14"/>
+    <p:sldId id="273" r:id="rId11"/>
+    <p:sldId id="274" r:id="rId12"/>
+    <p:sldId id="275" r:id="rId13"/>
+    <p:sldId id="267" r:id="rId14"/>
+    <p:sldId id="276" r:id="rId15"/>
+    <p:sldId id="272" r:id="rId16"/>
   </p:sldIdLst>
   <p:sldSz cx="12192000" cy="6858000"/>
   <p:notesSz cx="6858000" cy="9144000"/>
@@ -116,6 +118,11 @@
       </a:defRPr>
     </a:lvl9pPr>
   </p:defaultTextStyle>
+  <p:extLst>
+    <p:ext uri="{EFAFB233-063F-42B5-8137-9DF3F51BA10A}">
+      <p15:sldGuideLst xmlns:p15="http://schemas.microsoft.com/office/powerpoint/2012/main"/>
+    </p:ext>
+  </p:extLst>
 </p:presentation>
 </file>
 
@@ -287,7 +294,7 @@
           <a:p>
             <a:fld id="{6B86F8C3-12C9-446C-A34D-B52FC9F7B8D1}" type="datetimeFigureOut">
               <a:rPr lang="hr-HR" smtClean="0"/>
-              <a:t>21.5.2023.</a:t>
+              <a:t>3.6.2023.</a:t>
             </a:fld>
             <a:endParaRPr lang="hr-HR"/>
           </a:p>
@@ -515,7 +522,7 @@
           <a:p>
             <a:fld id="{6B86F8C3-12C9-446C-A34D-B52FC9F7B8D1}" type="datetimeFigureOut">
               <a:rPr lang="hr-HR" smtClean="0"/>
-              <a:t>21.5.2023.</a:t>
+              <a:t>3.6.2023.</a:t>
             </a:fld>
             <a:endParaRPr lang="hr-HR"/>
           </a:p>
@@ -695,7 +702,7 @@
           <a:p>
             <a:fld id="{6B86F8C3-12C9-446C-A34D-B52FC9F7B8D1}" type="datetimeFigureOut">
               <a:rPr lang="hr-HR" smtClean="0"/>
-              <a:t>21.5.2023.</a:t>
+              <a:t>3.6.2023.</a:t>
             </a:fld>
             <a:endParaRPr lang="hr-HR"/>
           </a:p>
@@ -865,7 +872,7 @@
           <a:p>
             <a:fld id="{6B86F8C3-12C9-446C-A34D-B52FC9F7B8D1}" type="datetimeFigureOut">
               <a:rPr lang="hr-HR" smtClean="0"/>
-              <a:t>21.5.2023.</a:t>
+              <a:t>3.6.2023.</a:t>
             </a:fld>
             <a:endParaRPr lang="hr-HR"/>
           </a:p>
@@ -1119,7 +1126,7 @@
           <a:p>
             <a:fld id="{6B86F8C3-12C9-446C-A34D-B52FC9F7B8D1}" type="datetimeFigureOut">
               <a:rPr lang="hr-HR" smtClean="0"/>
-              <a:t>21.5.2023.</a:t>
+              <a:t>3.6.2023.</a:t>
             </a:fld>
             <a:endParaRPr lang="hr-HR"/>
           </a:p>
@@ -1445,7 +1452,7 @@
           <a:p>
             <a:fld id="{6B86F8C3-12C9-446C-A34D-B52FC9F7B8D1}" type="datetimeFigureOut">
               <a:rPr lang="hr-HR" smtClean="0"/>
-              <a:t>21.5.2023.</a:t>
+              <a:t>3.6.2023.</a:t>
             </a:fld>
             <a:endParaRPr lang="hr-HR"/>
           </a:p>
@@ -1896,7 +1903,7 @@
           <a:p>
             <a:fld id="{6B86F8C3-12C9-446C-A34D-B52FC9F7B8D1}" type="datetimeFigureOut">
               <a:rPr lang="hr-HR" smtClean="0"/>
-              <a:t>21.5.2023.</a:t>
+              <a:t>3.6.2023.</a:t>
             </a:fld>
             <a:endParaRPr lang="hr-HR"/>
           </a:p>
@@ -2014,7 +2021,7 @@
           <a:p>
             <a:fld id="{6B86F8C3-12C9-446C-A34D-B52FC9F7B8D1}" type="datetimeFigureOut">
               <a:rPr lang="hr-HR" smtClean="0"/>
-              <a:t>21.5.2023.</a:t>
+              <a:t>3.6.2023.</a:t>
             </a:fld>
             <a:endParaRPr lang="hr-HR"/>
           </a:p>
@@ -2109,7 +2116,7 @@
           <a:p>
             <a:fld id="{6B86F8C3-12C9-446C-A34D-B52FC9F7B8D1}" type="datetimeFigureOut">
               <a:rPr lang="hr-HR" smtClean="0"/>
-              <a:t>21.5.2023.</a:t>
+              <a:t>3.6.2023.</a:t>
             </a:fld>
             <a:endParaRPr lang="hr-HR"/>
           </a:p>
@@ -2396,7 +2403,7 @@
           <a:p>
             <a:fld id="{6B86F8C3-12C9-446C-A34D-B52FC9F7B8D1}" type="datetimeFigureOut">
               <a:rPr lang="hr-HR" smtClean="0"/>
-              <a:t>21.5.2023.</a:t>
+              <a:t>3.6.2023.</a:t>
             </a:fld>
             <a:endParaRPr lang="hr-HR"/>
           </a:p>
@@ -2718,7 +2725,7 @@
           <a:p>
             <a:fld id="{6B86F8C3-12C9-446C-A34D-B52FC9F7B8D1}" type="datetimeFigureOut">
               <a:rPr lang="hr-HR" smtClean="0"/>
-              <a:t>21.5.2023.</a:t>
+              <a:t>3.6.2023.</a:t>
             </a:fld>
             <a:endParaRPr lang="hr-HR"/>
           </a:p>
@@ -2972,7 +2979,7 @@
           <a:p>
             <a:fld id="{6B86F8C3-12C9-446C-A34D-B52FC9F7B8D1}" type="datetimeFigureOut">
               <a:rPr lang="hr-HR" smtClean="0"/>
-              <a:t>21.5.2023.</a:t>
+              <a:t>3.6.2023.</a:t>
             </a:fld>
             <a:endParaRPr lang="hr-HR"/>
           </a:p>
@@ -3596,10 +3603,10 @@
       </p:grpSpPr>
       <p:pic>
         <p:nvPicPr>
-          <p:cNvPr id="10242" name="Picture 2">
+          <p:cNvPr id="1028" name="Picture 4">
             <a:extLst>
               <a:ext uri="{FF2B5EF4-FFF2-40B4-BE49-F238E27FC236}">
-                <a16:creationId xmlns:a16="http://schemas.microsoft.com/office/drawing/2014/main" id="{14723FD3-7CB2-1F21-BDA5-398DD796A578}"/>
+                <a16:creationId xmlns:a16="http://schemas.microsoft.com/office/drawing/2014/main" id="{6459F599-F7AE-9BBF-CB41-7E09F242C477}"/>
               </a:ext>
             </a:extLst>
           </p:cNvPr>
@@ -3623,8 +3630,85 @@
         </p:blipFill>
         <p:spPr bwMode="auto">
           <a:xfrm>
-            <a:off x="2601880" y="118959"/>
-            <a:ext cx="6988238" cy="5280198"/>
+            <a:off x="2162054" y="390043"/>
+            <a:ext cx="7867892" cy="6077913"/>
+          </a:xfrm>
+          <a:prstGeom prst="rect">
+            <a:avLst/>
+          </a:prstGeom>
+          <a:noFill/>
+          <a:extLst>
+            <a:ext uri="{909E8E84-426E-40DD-AFC4-6F175D3DCCD1}">
+              <a14:hiddenFill xmlns:a14="http://schemas.microsoft.com/office/drawing/2010/main">
+                <a:solidFill>
+                  <a:srgbClr val="FFFFFF"/>
+                </a:solidFill>
+              </a14:hiddenFill>
+            </a:ext>
+          </a:extLst>
+        </p:spPr>
+      </p:pic>
+    </p:spTree>
+    <p:extLst>
+      <p:ext uri="{BB962C8B-B14F-4D97-AF65-F5344CB8AC3E}">
+        <p14:creationId xmlns:p14="http://schemas.microsoft.com/office/powerpoint/2010/main" val="1644022956"/>
+      </p:ext>
+    </p:extLst>
+  </p:cSld>
+  <p:clrMapOvr>
+    <a:masterClrMapping/>
+  </p:clrMapOvr>
+</p:sld>
+</file>
+
+<file path=ppt/slides/slide11.xml><?xml version="1.0" encoding="utf-8"?>
+<p:sld xmlns:a="http://schemas.openxmlformats.org/drawingml/2006/main" xmlns:r="http://schemas.openxmlformats.org/officeDocument/2006/relationships" xmlns:p="http://schemas.openxmlformats.org/presentationml/2006/main">
+  <p:cSld>
+    <p:spTree>
+      <p:nvGrpSpPr>
+        <p:cNvPr id="1" name=""/>
+        <p:cNvGrpSpPr/>
+        <p:nvPr/>
+      </p:nvGrpSpPr>
+      <p:grpSpPr>
+        <a:xfrm>
+          <a:off x="0" y="0"/>
+          <a:ext cx="0" cy="0"/>
+          <a:chOff x="0" y="0"/>
+          <a:chExt cx="0" cy="0"/>
+        </a:xfrm>
+      </p:grpSpPr>
+      <p:pic>
+        <p:nvPicPr>
+          <p:cNvPr id="2050" name="Picture 2">
+            <a:extLst>
+              <a:ext uri="{FF2B5EF4-FFF2-40B4-BE49-F238E27FC236}">
+                <a16:creationId xmlns:a16="http://schemas.microsoft.com/office/drawing/2014/main" id="{B2DBCC2F-E294-A9CB-3D1E-804439E5BCAA}"/>
+              </a:ext>
+            </a:extLst>
+          </p:cNvPr>
+          <p:cNvPicPr>
+            <a:picLocks noChangeAspect="1" noChangeArrowheads="1"/>
+          </p:cNvPicPr>
+          <p:nvPr/>
+        </p:nvPicPr>
+        <p:blipFill>
+          <a:blip r:embed="rId2">
+            <a:extLst>
+              <a:ext uri="{28A0092B-C50C-407E-A947-70E740481C1C}">
+                <a14:useLocalDpi xmlns:a14="http://schemas.microsoft.com/office/drawing/2010/main" val="0"/>
+              </a:ext>
+            </a:extLst>
+          </a:blip>
+          <a:srcRect/>
+          <a:stretch>
+            <a:fillRect/>
+          </a:stretch>
+        </p:blipFill>
+        <p:spPr bwMode="auto">
+          <a:xfrm>
+            <a:off x="2079018" y="317361"/>
+            <a:ext cx="8033963" cy="6223278"/>
           </a:xfrm>
           <a:prstGeom prst="rect">
             <a:avLst/>
@@ -3654,549 +3738,10 @@
           </a:extLst>
         </p:spPr>
       </p:pic>
-      <p:graphicFrame>
-        <p:nvGraphicFramePr>
-          <p:cNvPr id="2" name="Table 1">
-            <a:extLst>
-              <a:ext uri="{FF2B5EF4-FFF2-40B4-BE49-F238E27FC236}">
-                <a16:creationId xmlns:a16="http://schemas.microsoft.com/office/drawing/2014/main" id="{74DE032D-20A0-4B6B-A23B-E5EE7965F6F9}"/>
-              </a:ext>
-            </a:extLst>
-          </p:cNvPr>
-          <p:cNvGraphicFramePr>
-            <a:graphicFrameLocks noGrp="1"/>
-          </p:cNvGraphicFramePr>
-          <p:nvPr>
-            <p:extLst>
-              <p:ext uri="{D42A27DB-BD31-4B8C-83A1-F6EECF244321}">
-                <p14:modId xmlns:p14="http://schemas.microsoft.com/office/powerpoint/2010/main" val="3392451224"/>
-              </p:ext>
-            </p:extLst>
-          </p:nvPr>
-        </p:nvGraphicFramePr>
-        <p:xfrm>
-          <a:off x="2601880" y="5450305"/>
-          <a:ext cx="7145706" cy="1288736"/>
-        </p:xfrm>
-        <a:graphic>
-          <a:graphicData uri="http://schemas.openxmlformats.org/drawingml/2006/table">
-            <a:tbl>
-              <a:tblPr firstRow="1" firstCol="1" bandRow="1">
-                <a:tableStyleId>{5C22544A-7EE6-4342-B048-85BDC9FD1C3A}</a:tableStyleId>
-              </a:tblPr>
-              <a:tblGrid>
-                <a:gridCol w="1072292">
-                  <a:extLst>
-                    <a:ext uri="{9D8B030D-6E8A-4147-A177-3AD203B41FA5}">
-                      <a16:colId xmlns:a16="http://schemas.microsoft.com/office/drawing/2014/main" val="3139838852"/>
-                    </a:ext>
-                  </a:extLst>
-                </a:gridCol>
-                <a:gridCol w="1012765">
-                  <a:extLst>
-                    <a:ext uri="{9D8B030D-6E8A-4147-A177-3AD203B41FA5}">
-                      <a16:colId xmlns:a16="http://schemas.microsoft.com/office/drawing/2014/main" val="3909754154"/>
-                    </a:ext>
-                  </a:extLst>
-                </a:gridCol>
-                <a:gridCol w="1011971">
-                  <a:extLst>
-                    <a:ext uri="{9D8B030D-6E8A-4147-A177-3AD203B41FA5}">
-                      <a16:colId xmlns:a16="http://schemas.microsoft.com/office/drawing/2014/main" val="2509845209"/>
-                    </a:ext>
-                  </a:extLst>
-                </a:gridCol>
-                <a:gridCol w="1011971">
-                  <a:extLst>
-                    <a:ext uri="{9D8B030D-6E8A-4147-A177-3AD203B41FA5}">
-                      <a16:colId xmlns:a16="http://schemas.microsoft.com/office/drawing/2014/main" val="1063769858"/>
-                    </a:ext>
-                  </a:extLst>
-                </a:gridCol>
-                <a:gridCol w="1011971">
-                  <a:extLst>
-                    <a:ext uri="{9D8B030D-6E8A-4147-A177-3AD203B41FA5}">
-                      <a16:colId xmlns:a16="http://schemas.microsoft.com/office/drawing/2014/main" val="294281009"/>
-                    </a:ext>
-                  </a:extLst>
-                </a:gridCol>
-                <a:gridCol w="1011971">
-                  <a:extLst>
-                    <a:ext uri="{9D8B030D-6E8A-4147-A177-3AD203B41FA5}">
-                      <a16:colId xmlns:a16="http://schemas.microsoft.com/office/drawing/2014/main" val="45959127"/>
-                    </a:ext>
-                  </a:extLst>
-                </a:gridCol>
-                <a:gridCol w="1012765">
-                  <a:extLst>
-                    <a:ext uri="{9D8B030D-6E8A-4147-A177-3AD203B41FA5}">
-                      <a16:colId xmlns:a16="http://schemas.microsoft.com/office/drawing/2014/main" val="1347149336"/>
-                    </a:ext>
-                  </a:extLst>
-                </a:gridCol>
-              </a:tblGrid>
-              <a:tr h="413090">
-                <a:tc>
-                  <a:txBody>
-                    <a:bodyPr/>
-                    <a:lstStyle/>
-                    <a:p>
-                      <a:pPr algn="just">
-                        <a:lnSpc>
-                          <a:spcPct val="150000"/>
-                        </a:lnSpc>
-                        <a:spcBef>
-                          <a:spcPts val="600"/>
-                        </a:spcBef>
-                        <a:spcAft>
-                          <a:spcPts val="300"/>
-                        </a:spcAft>
-                      </a:pPr>
-                      <a:r>
-                        <a:rPr lang="hr-HR" sz="1800">
-                          <a:effectLst/>
-                        </a:rPr>
-                        <a:t>k</a:t>
-                      </a:r>
-                      <a:endParaRPr lang="hr-HR" sz="1800">
-                        <a:effectLst/>
-                        <a:latin typeface="Times New Roman" panose="02020603050405020304" pitchFamily="18" charset="0"/>
-                        <a:ea typeface="Times New Roman" panose="02020603050405020304" pitchFamily="18" charset="0"/>
-                      </a:endParaRPr>
-                    </a:p>
-                  </a:txBody>
-                  <a:tcPr marL="68580" marR="68580" marT="0" marB="0"/>
-                </a:tc>
-                <a:tc>
-                  <a:txBody>
-                    <a:bodyPr/>
-                    <a:lstStyle/>
-                    <a:p>
-                      <a:pPr algn="just">
-                        <a:lnSpc>
-                          <a:spcPct val="150000"/>
-                        </a:lnSpc>
-                        <a:spcBef>
-                          <a:spcPts val="600"/>
-                        </a:spcBef>
-                        <a:spcAft>
-                          <a:spcPts val="300"/>
-                        </a:spcAft>
-                      </a:pPr>
-                      <a:r>
-                        <a:rPr lang="hr-HR" sz="1800" dirty="0">
-                          <a:effectLst/>
-                        </a:rPr>
-                        <a:t>10</a:t>
-                      </a:r>
-                      <a:endParaRPr lang="hr-HR" sz="1800" dirty="0">
-                        <a:effectLst/>
-                        <a:latin typeface="Times New Roman" panose="02020603050405020304" pitchFamily="18" charset="0"/>
-                        <a:ea typeface="Times New Roman" panose="02020603050405020304" pitchFamily="18" charset="0"/>
-                      </a:endParaRPr>
-                    </a:p>
-                  </a:txBody>
-                  <a:tcPr marL="68580" marR="68580" marT="0" marB="0"/>
-                </a:tc>
-                <a:tc>
-                  <a:txBody>
-                    <a:bodyPr/>
-                    <a:lstStyle/>
-                    <a:p>
-                      <a:pPr algn="just">
-                        <a:lnSpc>
-                          <a:spcPct val="150000"/>
-                        </a:lnSpc>
-                        <a:spcBef>
-                          <a:spcPts val="600"/>
-                        </a:spcBef>
-                        <a:spcAft>
-                          <a:spcPts val="300"/>
-                        </a:spcAft>
-                      </a:pPr>
-                      <a:r>
-                        <a:rPr lang="hr-HR" sz="1800">
-                          <a:effectLst/>
-                        </a:rPr>
-                        <a:t>20</a:t>
-                      </a:r>
-                      <a:endParaRPr lang="hr-HR" sz="1800">
-                        <a:effectLst/>
-                        <a:latin typeface="Times New Roman" panose="02020603050405020304" pitchFamily="18" charset="0"/>
-                        <a:ea typeface="Times New Roman" panose="02020603050405020304" pitchFamily="18" charset="0"/>
-                      </a:endParaRPr>
-                    </a:p>
-                  </a:txBody>
-                  <a:tcPr marL="68580" marR="68580" marT="0" marB="0"/>
-                </a:tc>
-                <a:tc>
-                  <a:txBody>
-                    <a:bodyPr/>
-                    <a:lstStyle/>
-                    <a:p>
-                      <a:pPr algn="just">
-                        <a:lnSpc>
-                          <a:spcPct val="150000"/>
-                        </a:lnSpc>
-                        <a:spcBef>
-                          <a:spcPts val="600"/>
-                        </a:spcBef>
-                        <a:spcAft>
-                          <a:spcPts val="300"/>
-                        </a:spcAft>
-                      </a:pPr>
-                      <a:r>
-                        <a:rPr lang="hr-HR" sz="1800">
-                          <a:effectLst/>
-                        </a:rPr>
-                        <a:t>50</a:t>
-                      </a:r>
-                      <a:endParaRPr lang="hr-HR" sz="1800">
-                        <a:effectLst/>
-                        <a:latin typeface="Times New Roman" panose="02020603050405020304" pitchFamily="18" charset="0"/>
-                        <a:ea typeface="Times New Roman" panose="02020603050405020304" pitchFamily="18" charset="0"/>
-                      </a:endParaRPr>
-                    </a:p>
-                  </a:txBody>
-                  <a:tcPr marL="68580" marR="68580" marT="0" marB="0"/>
-                </a:tc>
-                <a:tc>
-                  <a:txBody>
-                    <a:bodyPr/>
-                    <a:lstStyle/>
-                    <a:p>
-                      <a:pPr algn="just">
-                        <a:lnSpc>
-                          <a:spcPct val="150000"/>
-                        </a:lnSpc>
-                        <a:spcBef>
-                          <a:spcPts val="600"/>
-                        </a:spcBef>
-                        <a:spcAft>
-                          <a:spcPts val="300"/>
-                        </a:spcAft>
-                      </a:pPr>
-                      <a:r>
-                        <a:rPr lang="hr-HR" sz="1800">
-                          <a:effectLst/>
-                        </a:rPr>
-                        <a:t>100</a:t>
-                      </a:r>
-                      <a:endParaRPr lang="hr-HR" sz="1800">
-                        <a:effectLst/>
-                        <a:latin typeface="Times New Roman" panose="02020603050405020304" pitchFamily="18" charset="0"/>
-                        <a:ea typeface="Times New Roman" panose="02020603050405020304" pitchFamily="18" charset="0"/>
-                      </a:endParaRPr>
-                    </a:p>
-                  </a:txBody>
-                  <a:tcPr marL="68580" marR="68580" marT="0" marB="0"/>
-                </a:tc>
-                <a:tc>
-                  <a:txBody>
-                    <a:bodyPr/>
-                    <a:lstStyle/>
-                    <a:p>
-                      <a:pPr algn="just">
-                        <a:lnSpc>
-                          <a:spcPct val="150000"/>
-                        </a:lnSpc>
-                        <a:spcBef>
-                          <a:spcPts val="600"/>
-                        </a:spcBef>
-                        <a:spcAft>
-                          <a:spcPts val="300"/>
-                        </a:spcAft>
-                      </a:pPr>
-                      <a:r>
-                        <a:rPr lang="hr-HR" sz="1800">
-                          <a:effectLst/>
-                        </a:rPr>
-                        <a:t>200</a:t>
-                      </a:r>
-                      <a:endParaRPr lang="hr-HR" sz="1800">
-                        <a:effectLst/>
-                        <a:latin typeface="Times New Roman" panose="02020603050405020304" pitchFamily="18" charset="0"/>
-                        <a:ea typeface="Times New Roman" panose="02020603050405020304" pitchFamily="18" charset="0"/>
-                      </a:endParaRPr>
-                    </a:p>
-                  </a:txBody>
-                  <a:tcPr marL="68580" marR="68580" marT="0" marB="0"/>
-                </a:tc>
-                <a:tc>
-                  <a:txBody>
-                    <a:bodyPr/>
-                    <a:lstStyle/>
-                    <a:p>
-                      <a:pPr algn="just">
-                        <a:lnSpc>
-                          <a:spcPct val="150000"/>
-                        </a:lnSpc>
-                        <a:spcBef>
-                          <a:spcPts val="600"/>
-                        </a:spcBef>
-                        <a:spcAft>
-                          <a:spcPts val="300"/>
-                        </a:spcAft>
-                      </a:pPr>
-                      <a:r>
-                        <a:rPr lang="hr-HR" sz="1800">
-                          <a:effectLst/>
-                        </a:rPr>
-                        <a:t>500</a:t>
-                      </a:r>
-                      <a:endParaRPr lang="hr-HR" sz="1800">
-                        <a:effectLst/>
-                        <a:latin typeface="Times New Roman" panose="02020603050405020304" pitchFamily="18" charset="0"/>
-                        <a:ea typeface="Times New Roman" panose="02020603050405020304" pitchFamily="18" charset="0"/>
-                      </a:endParaRPr>
-                    </a:p>
-                  </a:txBody>
-                  <a:tcPr marL="68580" marR="68580" marT="0" marB="0"/>
-                </a:tc>
-                <a:extLst>
-                  <a:ext uri="{0D108BD9-81ED-4DB2-BD59-A6C34878D82A}">
-                    <a16:rowId xmlns:a16="http://schemas.microsoft.com/office/drawing/2014/main" val="788309063"/>
-                  </a:ext>
-                </a:extLst>
-              </a:tr>
-              <a:tr h="875646">
-                <a:tc>
-                  <a:txBody>
-                    <a:bodyPr/>
-                    <a:lstStyle/>
-                    <a:p>
-                      <a:pPr algn="just">
-                        <a:lnSpc>
-                          <a:spcPct val="150000"/>
-                        </a:lnSpc>
-                        <a:spcBef>
-                          <a:spcPts val="600"/>
-                        </a:spcBef>
-                        <a:spcAft>
-                          <a:spcPts val="300"/>
-                        </a:spcAft>
-                      </a:pPr>
-                      <a:r>
-                        <a:rPr lang="hr-HR" sz="1800" dirty="0">
-                          <a:effectLst/>
-                        </a:rPr>
-                        <a:t>Vrijeme/</a:t>
-                      </a:r>
-                      <a:r>
-                        <a:rPr lang="hr-HR" sz="1800" dirty="0" err="1">
-                          <a:effectLst/>
-                        </a:rPr>
-                        <a:t>ms</a:t>
-                      </a:r>
-                      <a:endParaRPr lang="hr-HR" sz="1800" dirty="0">
-                        <a:effectLst/>
-                        <a:latin typeface="Times New Roman" panose="02020603050405020304" pitchFamily="18" charset="0"/>
-                        <a:ea typeface="Times New Roman" panose="02020603050405020304" pitchFamily="18" charset="0"/>
-                      </a:endParaRPr>
-                    </a:p>
-                  </a:txBody>
-                  <a:tcPr marL="68580" marR="68580" marT="0" marB="0"/>
-                </a:tc>
-                <a:tc>
-                  <a:txBody>
-                    <a:bodyPr/>
-                    <a:lstStyle/>
-                    <a:p>
-                      <a:pPr algn="just">
-                        <a:lnSpc>
-                          <a:spcPct val="150000"/>
-                        </a:lnSpc>
-                        <a:spcBef>
-                          <a:spcPts val="600"/>
-                        </a:spcBef>
-                        <a:spcAft>
-                          <a:spcPts val="300"/>
-                        </a:spcAft>
-                      </a:pPr>
-                      <a:r>
-                        <a:rPr lang="hr-HR" sz="1800">
-                          <a:effectLst/>
-                        </a:rPr>
-                        <a:t>139426</a:t>
-                      </a:r>
-                      <a:endParaRPr lang="hr-HR" sz="1800">
-                        <a:effectLst/>
-                        <a:latin typeface="Times New Roman" panose="02020603050405020304" pitchFamily="18" charset="0"/>
-                        <a:ea typeface="Times New Roman" panose="02020603050405020304" pitchFamily="18" charset="0"/>
-                      </a:endParaRPr>
-                    </a:p>
-                  </a:txBody>
-                  <a:tcPr marL="68580" marR="68580" marT="0" marB="0"/>
-                </a:tc>
-                <a:tc>
-                  <a:txBody>
-                    <a:bodyPr/>
-                    <a:lstStyle/>
-                    <a:p>
-                      <a:pPr algn="just">
-                        <a:lnSpc>
-                          <a:spcPct val="150000"/>
-                        </a:lnSpc>
-                        <a:spcBef>
-                          <a:spcPts val="600"/>
-                        </a:spcBef>
-                        <a:spcAft>
-                          <a:spcPts val="300"/>
-                        </a:spcAft>
-                      </a:pPr>
-                      <a:r>
-                        <a:rPr lang="hr-HR" sz="1800">
-                          <a:effectLst/>
-                        </a:rPr>
-                        <a:t>547919</a:t>
-                      </a:r>
-                      <a:endParaRPr lang="hr-HR" sz="1800">
-                        <a:effectLst/>
-                        <a:latin typeface="Times New Roman" panose="02020603050405020304" pitchFamily="18" charset="0"/>
-                        <a:ea typeface="Times New Roman" panose="02020603050405020304" pitchFamily="18" charset="0"/>
-                      </a:endParaRPr>
-                    </a:p>
-                  </a:txBody>
-                  <a:tcPr marL="68580" marR="68580" marT="0" marB="0"/>
-                </a:tc>
-                <a:tc>
-                  <a:txBody>
-                    <a:bodyPr/>
-                    <a:lstStyle/>
-                    <a:p>
-                      <a:pPr algn="just">
-                        <a:lnSpc>
-                          <a:spcPct val="150000"/>
-                        </a:lnSpc>
-                        <a:spcBef>
-                          <a:spcPts val="600"/>
-                        </a:spcBef>
-                        <a:spcAft>
-                          <a:spcPts val="300"/>
-                        </a:spcAft>
-                      </a:pPr>
-                      <a:r>
-                        <a:rPr lang="hr-HR" sz="1800">
-                          <a:effectLst/>
-                        </a:rPr>
-                        <a:t>578915</a:t>
-                      </a:r>
-                      <a:endParaRPr lang="hr-HR" sz="1800">
-                        <a:effectLst/>
-                        <a:latin typeface="Times New Roman" panose="02020603050405020304" pitchFamily="18" charset="0"/>
-                        <a:ea typeface="Times New Roman" panose="02020603050405020304" pitchFamily="18" charset="0"/>
-                      </a:endParaRPr>
-                    </a:p>
-                  </a:txBody>
-                  <a:tcPr marL="68580" marR="68580" marT="0" marB="0"/>
-                </a:tc>
-                <a:tc>
-                  <a:txBody>
-                    <a:bodyPr/>
-                    <a:lstStyle/>
-                    <a:p>
-                      <a:pPr algn="just">
-                        <a:lnSpc>
-                          <a:spcPct val="150000"/>
-                        </a:lnSpc>
-                        <a:spcBef>
-                          <a:spcPts val="600"/>
-                        </a:spcBef>
-                        <a:spcAft>
-                          <a:spcPts val="300"/>
-                        </a:spcAft>
-                      </a:pPr>
-                      <a:r>
-                        <a:rPr lang="hr-HR" sz="1800">
-                          <a:effectLst/>
-                        </a:rPr>
-                        <a:t>586751</a:t>
-                      </a:r>
-                      <a:endParaRPr lang="hr-HR" sz="1800">
-                        <a:effectLst/>
-                        <a:latin typeface="Times New Roman" panose="02020603050405020304" pitchFamily="18" charset="0"/>
-                        <a:ea typeface="Times New Roman" panose="02020603050405020304" pitchFamily="18" charset="0"/>
-                      </a:endParaRPr>
-                    </a:p>
-                  </a:txBody>
-                  <a:tcPr marL="68580" marR="68580" marT="0" marB="0"/>
-                </a:tc>
-                <a:tc>
-                  <a:txBody>
-                    <a:bodyPr/>
-                    <a:lstStyle/>
-                    <a:p>
-                      <a:pPr algn="just">
-                        <a:lnSpc>
-                          <a:spcPct val="150000"/>
-                        </a:lnSpc>
-                        <a:spcBef>
-                          <a:spcPts val="600"/>
-                        </a:spcBef>
-                        <a:spcAft>
-                          <a:spcPts val="300"/>
-                        </a:spcAft>
-                      </a:pPr>
-                      <a:r>
-                        <a:rPr lang="hr-HR" sz="1800">
-                          <a:effectLst/>
-                        </a:rPr>
-                        <a:t>619190</a:t>
-                      </a:r>
-                      <a:endParaRPr lang="hr-HR" sz="1800">
-                        <a:effectLst/>
-                        <a:latin typeface="Times New Roman" panose="02020603050405020304" pitchFamily="18" charset="0"/>
-                        <a:ea typeface="Times New Roman" panose="02020603050405020304" pitchFamily="18" charset="0"/>
-                      </a:endParaRPr>
-                    </a:p>
-                  </a:txBody>
-                  <a:tcPr marL="68580" marR="68580" marT="0" marB="0"/>
-                </a:tc>
-                <a:tc>
-                  <a:txBody>
-                    <a:bodyPr/>
-                    <a:lstStyle/>
-                    <a:p>
-                      <a:pPr algn="just">
-                        <a:lnSpc>
-                          <a:spcPct val="150000"/>
-                        </a:lnSpc>
-                        <a:spcBef>
-                          <a:spcPts val="600"/>
-                        </a:spcBef>
-                        <a:spcAft>
-                          <a:spcPts val="300"/>
-                        </a:spcAft>
-                      </a:pPr>
-                      <a:r>
-                        <a:rPr lang="hr-HR" sz="1800" dirty="0">
-                          <a:effectLst/>
-                        </a:rPr>
-                        <a:t>630851</a:t>
-                      </a:r>
-                      <a:endParaRPr lang="hr-HR" sz="1800" dirty="0">
-                        <a:effectLst/>
-                        <a:latin typeface="Times New Roman" panose="02020603050405020304" pitchFamily="18" charset="0"/>
-                        <a:ea typeface="Times New Roman" panose="02020603050405020304" pitchFamily="18" charset="0"/>
-                      </a:endParaRPr>
-                    </a:p>
-                  </a:txBody>
-                  <a:tcPr marL="68580" marR="68580" marT="0" marB="0"/>
-                </a:tc>
-                <a:extLst>
-                  <a:ext uri="{0D108BD9-81ED-4DB2-BD59-A6C34878D82A}">
-                    <a16:rowId xmlns:a16="http://schemas.microsoft.com/office/drawing/2014/main" val="2903533407"/>
-                  </a:ext>
-                </a:extLst>
-              </a:tr>
-            </a:tbl>
-          </a:graphicData>
-        </a:graphic>
-      </p:graphicFrame>
     </p:spTree>
     <p:extLst>
       <p:ext uri="{BB962C8B-B14F-4D97-AF65-F5344CB8AC3E}">
-        <p14:creationId xmlns:p14="http://schemas.microsoft.com/office/powerpoint/2010/main" val="1491491967"/>
+        <p14:creationId xmlns:p14="http://schemas.microsoft.com/office/powerpoint/2010/main" val="4154804890"/>
       </p:ext>
     </p:extLst>
   </p:cSld>
@@ -4206,7 +3751,97 @@
 </p:sld>
 </file>
 
-<file path=ppt/slides/slide11.xml><?xml version="1.0" encoding="utf-8"?>
+<file path=ppt/slides/slide12.xml><?xml version="1.0" encoding="utf-8"?>
+<p:sld xmlns:a="http://schemas.openxmlformats.org/drawingml/2006/main" xmlns:r="http://schemas.openxmlformats.org/officeDocument/2006/relationships" xmlns:p="http://schemas.openxmlformats.org/presentationml/2006/main">
+  <p:cSld>
+    <p:spTree>
+      <p:nvGrpSpPr>
+        <p:cNvPr id="1" name=""/>
+        <p:cNvGrpSpPr/>
+        <p:nvPr/>
+      </p:nvGrpSpPr>
+      <p:grpSpPr>
+        <a:xfrm>
+          <a:off x="0" y="0"/>
+          <a:ext cx="0" cy="0"/>
+          <a:chOff x="0" y="0"/>
+          <a:chExt cx="0" cy="0"/>
+        </a:xfrm>
+      </p:grpSpPr>
+      <p:pic>
+        <p:nvPicPr>
+          <p:cNvPr id="3074" name="Picture 2">
+            <a:extLst>
+              <a:ext uri="{FF2B5EF4-FFF2-40B4-BE49-F238E27FC236}">
+                <a16:creationId xmlns:a16="http://schemas.microsoft.com/office/drawing/2014/main" id="{2E68D57B-C0C0-5D65-DDB6-711B44372988}"/>
+              </a:ext>
+            </a:extLst>
+          </p:cNvPr>
+          <p:cNvPicPr>
+            <a:picLocks noChangeAspect="1" noChangeArrowheads="1"/>
+          </p:cNvPicPr>
+          <p:nvPr/>
+        </p:nvPicPr>
+        <p:blipFill>
+          <a:blip r:embed="rId2">
+            <a:extLst>
+              <a:ext uri="{28A0092B-C50C-407E-A947-70E740481C1C}">
+                <a14:useLocalDpi xmlns:a14="http://schemas.microsoft.com/office/drawing/2010/main" val="0"/>
+              </a:ext>
+            </a:extLst>
+          </a:blip>
+          <a:srcRect/>
+          <a:stretch>
+            <a:fillRect/>
+          </a:stretch>
+        </p:blipFill>
+        <p:spPr bwMode="auto">
+          <a:xfrm>
+            <a:off x="2335928" y="518662"/>
+            <a:ext cx="7520143" cy="5820676"/>
+          </a:xfrm>
+          <a:prstGeom prst="rect">
+            <a:avLst/>
+          </a:prstGeom>
+          <a:noFill/>
+          <a:ln>
+            <a:noFill/>
+          </a:ln>
+          <a:extLst>
+            <a:ext uri="{909E8E84-426E-40DD-AFC4-6F175D3DCCD1}">
+              <a14:hiddenFill xmlns:a14="http://schemas.microsoft.com/office/drawing/2010/main">
+                <a:solidFill>
+                  <a:srgbClr val="FFFFFF"/>
+                </a:solidFill>
+              </a14:hiddenFill>
+            </a:ext>
+            <a:ext uri="{91240B29-F687-4F45-9708-019B960494DF}">
+              <a14:hiddenLine xmlns:a14="http://schemas.microsoft.com/office/drawing/2010/main" w="9525">
+                <a:solidFill>
+                  <a:srgbClr val="000000"/>
+                </a:solidFill>
+                <a:miter lim="800000"/>
+                <a:headEnd/>
+                <a:tailEnd/>
+              </a14:hiddenLine>
+            </a:ext>
+          </a:extLst>
+        </p:spPr>
+      </p:pic>
+    </p:spTree>
+    <p:extLst>
+      <p:ext uri="{BB962C8B-B14F-4D97-AF65-F5344CB8AC3E}">
+        <p14:creationId xmlns:p14="http://schemas.microsoft.com/office/powerpoint/2010/main" val="3423868026"/>
+      </p:ext>
+    </p:extLst>
+  </p:cSld>
+  <p:clrMapOvr>
+    <a:masterClrMapping/>
+  </p:clrMapOvr>
+</p:sld>
+</file>
+
+<file path=ppt/slides/slide13.xml><?xml version="1.0" encoding="utf-8"?>
 <p:sld xmlns:a="http://schemas.openxmlformats.org/drawingml/2006/main" xmlns:r="http://schemas.openxmlformats.org/officeDocument/2006/relationships" xmlns:p="http://schemas.openxmlformats.org/presentationml/2006/main">
   <p:cSld>
     <p:bg>
@@ -4302,8 +3937,8 @@
           </a:extLst>
         </p:spPr>
       </p:pic>
-      <mc:AlternateContent xmlns:mc="http://schemas.openxmlformats.org/markup-compatibility/2006">
-        <mc:Choice xmlns:a14="http://schemas.microsoft.com/office/drawing/2010/main" Requires="a14">
+      <mc:AlternateContent xmlns:mc="http://schemas.openxmlformats.org/markup-compatibility/2006" xmlns:a14="http://schemas.microsoft.com/office/drawing/2010/main">
+        <mc:Choice Requires="a14">
           <p:sp>
             <p:nvSpPr>
               <p:cNvPr id="2" name="TextBox 1">
@@ -4332,6 +3967,7 @@
               </a:bodyPr>
               <a:lstStyle/>
               <a:p>
+                <a:pPr/>
                 <a14:m>
                   <m:oMathPara xmlns:m="http://schemas.openxmlformats.org/officeDocument/2006/math">
                     <m:oMathParaPr>
@@ -4343,7 +3979,7 @@
                           <m:nor/>
                         </m:rPr>
                         <a:rPr lang="hr-HR" sz="2800"/>
-                        <m:t>4 * 3 * (</m:t>
+                        <m:t>4 ∗ 3 ∗ (</m:t>
                       </m:r>
                       <m:r>
                         <m:rPr>
@@ -4357,7 +3993,7 @@
                           <m:nor/>
                         </m:rPr>
                         <a:rPr lang="hr-HR" sz="2800"/>
-                        <m:t> + 2 * (</m:t>
+                        <m:t> + 2 ∗ (</m:t>
                       </m:r>
                       <m:r>
                         <m:rPr>
@@ -4371,7 +4007,7 @@
                           <m:nor/>
                         </m:rPr>
                         <a:rPr lang="hr-HR" sz="2800"/>
-                        <m:t>-1) + 2 * (</m:t>
+                        <m:t>−1) + 2 ∗ (</m:t>
                       </m:r>
                       <m:r>
                         <m:rPr>
@@ -4385,7 +4021,7 @@
                           <m:nor/>
                         </m:rPr>
                         <a:rPr lang="hr-HR" sz="2800"/>
-                        <m:t>-2)) [</m:t>
+                        <m:t>−2)) [</m:t>
                       </m:r>
                       <m:r>
                         <m:rPr>
@@ -4409,7 +4045,7 @@
             </p:txBody>
           </p:sp>
         </mc:Choice>
-        <mc:Fallback>
+        <mc:Fallback xmlns="">
           <p:sp>
             <p:nvSpPr>
               <p:cNvPr id="2" name="TextBox 1">
@@ -4652,7 +4288,7 @@
 </p:sld>
 </file>
 
-<file path=ppt/slides/slide12.xml><?xml version="1.0" encoding="utf-8"?>
+<file path=ppt/slides/slide14.xml><?xml version="1.0" encoding="utf-8"?>
 <p:sld xmlns:a="http://schemas.openxmlformats.org/drawingml/2006/main" xmlns:r="http://schemas.openxmlformats.org/officeDocument/2006/relationships" xmlns:p="http://schemas.openxmlformats.org/presentationml/2006/main">
   <p:cSld>
     <p:spTree>
@@ -4671,10 +4307,10 @@
       </p:grpSpPr>
       <p:pic>
         <p:nvPicPr>
-          <p:cNvPr id="12290" name="Picture 2">
+          <p:cNvPr id="4098" name="Picture 2">
             <a:extLst>
               <a:ext uri="{FF2B5EF4-FFF2-40B4-BE49-F238E27FC236}">
-                <a16:creationId xmlns:a16="http://schemas.microsoft.com/office/drawing/2014/main" id="{3A97203C-95AD-6CF7-D0D0-7AA9E6D06129}"/>
+                <a16:creationId xmlns:a16="http://schemas.microsoft.com/office/drawing/2014/main" id="{36FA5AB2-BDB5-C03B-B167-C0DFDC3ED476}"/>
               </a:ext>
             </a:extLst>
           </p:cNvPr>
@@ -4698,16 +4334,13 @@
         </p:blipFill>
         <p:spPr bwMode="auto">
           <a:xfrm>
-            <a:off x="2331231" y="213490"/>
-            <a:ext cx="6639201" cy="4956741"/>
+            <a:off x="2085349" y="277280"/>
+            <a:ext cx="8021301" cy="6303440"/>
           </a:xfrm>
           <a:prstGeom prst="rect">
             <a:avLst/>
           </a:prstGeom>
           <a:noFill/>
-          <a:ln>
-            <a:noFill/>
-          </a:ln>
           <a:extLst>
             <a:ext uri="{909E8E84-426E-40DD-AFC4-6F175D3DCCD1}">
               <a14:hiddenFill xmlns:a14="http://schemas.microsoft.com/office/drawing/2010/main">
@@ -4716,556 +4349,13 @@
                 </a:solidFill>
               </a14:hiddenFill>
             </a:ext>
-            <a:ext uri="{91240B29-F687-4F45-9708-019B960494DF}">
-              <a14:hiddenLine xmlns:a14="http://schemas.microsoft.com/office/drawing/2010/main" w="9525">
-                <a:solidFill>
-                  <a:srgbClr val="000000"/>
-                </a:solidFill>
-                <a:miter lim="800000"/>
-                <a:headEnd/>
-                <a:tailEnd/>
-              </a14:hiddenLine>
-            </a:ext>
           </a:extLst>
         </p:spPr>
       </p:pic>
-      <p:graphicFrame>
-        <p:nvGraphicFramePr>
-          <p:cNvPr id="2" name="Table 1">
-            <a:extLst>
-              <a:ext uri="{FF2B5EF4-FFF2-40B4-BE49-F238E27FC236}">
-                <a16:creationId xmlns:a16="http://schemas.microsoft.com/office/drawing/2014/main" id="{C85E44B1-F26C-4B41-E06A-20E46AFD4BEB}"/>
-              </a:ext>
-            </a:extLst>
-          </p:cNvPr>
-          <p:cNvGraphicFramePr>
-            <a:graphicFrameLocks noGrp="1"/>
-          </p:cNvGraphicFramePr>
-          <p:nvPr>
-            <p:extLst>
-              <p:ext uri="{D42A27DB-BD31-4B8C-83A1-F6EECF244321}">
-                <p14:modId xmlns:p14="http://schemas.microsoft.com/office/powerpoint/2010/main" val="3601894664"/>
-              </p:ext>
-            </p:extLst>
-          </p:nvPr>
-        </p:nvGraphicFramePr>
-        <p:xfrm>
-          <a:off x="1863265" y="5170231"/>
-          <a:ext cx="8180422" cy="1545972"/>
-        </p:xfrm>
-        <a:graphic>
-          <a:graphicData uri="http://schemas.openxmlformats.org/drawingml/2006/table">
-            <a:tbl>
-              <a:tblPr firstRow="1" firstCol="1" bandRow="1">
-                <a:tableStyleId>{5C22544A-7EE6-4342-B048-85BDC9FD1C3A}</a:tableStyleId>
-              </a:tblPr>
-              <a:tblGrid>
-                <a:gridCol w="1168502">
-                  <a:extLst>
-                    <a:ext uri="{9D8B030D-6E8A-4147-A177-3AD203B41FA5}">
-                      <a16:colId xmlns:a16="http://schemas.microsoft.com/office/drawing/2014/main" val="981086453"/>
-                    </a:ext>
-                  </a:extLst>
-                </a:gridCol>
-                <a:gridCol w="1168502">
-                  <a:extLst>
-                    <a:ext uri="{9D8B030D-6E8A-4147-A177-3AD203B41FA5}">
-                      <a16:colId xmlns:a16="http://schemas.microsoft.com/office/drawing/2014/main" val="2869085662"/>
-                    </a:ext>
-                  </a:extLst>
-                </a:gridCol>
-                <a:gridCol w="1168502">
-                  <a:extLst>
-                    <a:ext uri="{9D8B030D-6E8A-4147-A177-3AD203B41FA5}">
-                      <a16:colId xmlns:a16="http://schemas.microsoft.com/office/drawing/2014/main" val="1191766357"/>
-                    </a:ext>
-                  </a:extLst>
-                </a:gridCol>
-                <a:gridCol w="1168502">
-                  <a:extLst>
-                    <a:ext uri="{9D8B030D-6E8A-4147-A177-3AD203B41FA5}">
-                      <a16:colId xmlns:a16="http://schemas.microsoft.com/office/drawing/2014/main" val="3829609978"/>
-                    </a:ext>
-                  </a:extLst>
-                </a:gridCol>
-                <a:gridCol w="1168502">
-                  <a:extLst>
-                    <a:ext uri="{9D8B030D-6E8A-4147-A177-3AD203B41FA5}">
-                      <a16:colId xmlns:a16="http://schemas.microsoft.com/office/drawing/2014/main" val="3855203645"/>
-                    </a:ext>
-                  </a:extLst>
-                </a:gridCol>
-                <a:gridCol w="1168502">
-                  <a:extLst>
-                    <a:ext uri="{9D8B030D-6E8A-4147-A177-3AD203B41FA5}">
-                      <a16:colId xmlns:a16="http://schemas.microsoft.com/office/drawing/2014/main" val="3803234425"/>
-                    </a:ext>
-                  </a:extLst>
-                </a:gridCol>
-                <a:gridCol w="1169410">
-                  <a:extLst>
-                    <a:ext uri="{9D8B030D-6E8A-4147-A177-3AD203B41FA5}">
-                      <a16:colId xmlns:a16="http://schemas.microsoft.com/office/drawing/2014/main" val="3918427891"/>
-                    </a:ext>
-                  </a:extLst>
-                </a:gridCol>
-              </a:tblGrid>
-              <a:tr h="307353">
-                <a:tc>
-                  <a:txBody>
-                    <a:bodyPr/>
-                    <a:lstStyle/>
-                    <a:p>
-                      <a:pPr algn="l">
-                        <a:lnSpc>
-                          <a:spcPct val="150000"/>
-                        </a:lnSpc>
-                        <a:spcBef>
-                          <a:spcPts val="600"/>
-                        </a:spcBef>
-                        <a:spcAft>
-                          <a:spcPts val="300"/>
-                        </a:spcAft>
-                      </a:pPr>
-                      <a:r>
-                        <a:rPr lang="hr-HR" sz="1800">
-                          <a:effectLst/>
-                        </a:rPr>
-                        <a:t>K</a:t>
-                      </a:r>
-                      <a:endParaRPr lang="hr-HR" sz="1800">
-                        <a:effectLst/>
-                        <a:latin typeface="Times New Roman" panose="02020603050405020304" pitchFamily="18" charset="0"/>
-                        <a:ea typeface="Times New Roman" panose="02020603050405020304" pitchFamily="18" charset="0"/>
-                      </a:endParaRPr>
-                    </a:p>
-                  </a:txBody>
-                  <a:tcPr marL="68580" marR="68580" marT="0" marB="0"/>
-                </a:tc>
-                <a:tc>
-                  <a:txBody>
-                    <a:bodyPr/>
-                    <a:lstStyle/>
-                    <a:p>
-                      <a:pPr algn="l">
-                        <a:lnSpc>
-                          <a:spcPct val="150000"/>
-                        </a:lnSpc>
-                        <a:spcBef>
-                          <a:spcPts val="600"/>
-                        </a:spcBef>
-                        <a:spcAft>
-                          <a:spcPts val="300"/>
-                        </a:spcAft>
-                      </a:pPr>
-                      <a:r>
-                        <a:rPr lang="hr-HR" sz="1800">
-                          <a:effectLst/>
-                        </a:rPr>
-                        <a:t>10</a:t>
-                      </a:r>
-                      <a:endParaRPr lang="hr-HR" sz="1800">
-                        <a:effectLst/>
-                        <a:latin typeface="Times New Roman" panose="02020603050405020304" pitchFamily="18" charset="0"/>
-                        <a:ea typeface="Times New Roman" panose="02020603050405020304" pitchFamily="18" charset="0"/>
-                      </a:endParaRPr>
-                    </a:p>
-                  </a:txBody>
-                  <a:tcPr marL="68580" marR="68580" marT="0" marB="0"/>
-                </a:tc>
-                <a:tc>
-                  <a:txBody>
-                    <a:bodyPr/>
-                    <a:lstStyle/>
-                    <a:p>
-                      <a:pPr algn="l">
-                        <a:lnSpc>
-                          <a:spcPct val="150000"/>
-                        </a:lnSpc>
-                        <a:spcBef>
-                          <a:spcPts val="600"/>
-                        </a:spcBef>
-                        <a:spcAft>
-                          <a:spcPts val="300"/>
-                        </a:spcAft>
-                      </a:pPr>
-                      <a:r>
-                        <a:rPr lang="hr-HR" sz="1800">
-                          <a:effectLst/>
-                        </a:rPr>
-                        <a:t>20</a:t>
-                      </a:r>
-                      <a:endParaRPr lang="hr-HR" sz="1800">
-                        <a:effectLst/>
-                        <a:latin typeface="Times New Roman" panose="02020603050405020304" pitchFamily="18" charset="0"/>
-                        <a:ea typeface="Times New Roman" panose="02020603050405020304" pitchFamily="18" charset="0"/>
-                      </a:endParaRPr>
-                    </a:p>
-                  </a:txBody>
-                  <a:tcPr marL="68580" marR="68580" marT="0" marB="0"/>
-                </a:tc>
-                <a:tc>
-                  <a:txBody>
-                    <a:bodyPr/>
-                    <a:lstStyle/>
-                    <a:p>
-                      <a:pPr algn="l">
-                        <a:lnSpc>
-                          <a:spcPct val="150000"/>
-                        </a:lnSpc>
-                        <a:spcBef>
-                          <a:spcPts val="600"/>
-                        </a:spcBef>
-                        <a:spcAft>
-                          <a:spcPts val="300"/>
-                        </a:spcAft>
-                      </a:pPr>
-                      <a:r>
-                        <a:rPr lang="hr-HR" sz="1800">
-                          <a:effectLst/>
-                        </a:rPr>
-                        <a:t>50</a:t>
-                      </a:r>
-                      <a:endParaRPr lang="hr-HR" sz="1800">
-                        <a:effectLst/>
-                        <a:latin typeface="Times New Roman" panose="02020603050405020304" pitchFamily="18" charset="0"/>
-                        <a:ea typeface="Times New Roman" panose="02020603050405020304" pitchFamily="18" charset="0"/>
-                      </a:endParaRPr>
-                    </a:p>
-                  </a:txBody>
-                  <a:tcPr marL="68580" marR="68580" marT="0" marB="0"/>
-                </a:tc>
-                <a:tc>
-                  <a:txBody>
-                    <a:bodyPr/>
-                    <a:lstStyle/>
-                    <a:p>
-                      <a:pPr algn="l">
-                        <a:lnSpc>
-                          <a:spcPct val="150000"/>
-                        </a:lnSpc>
-                        <a:spcBef>
-                          <a:spcPts val="600"/>
-                        </a:spcBef>
-                        <a:spcAft>
-                          <a:spcPts val="300"/>
-                        </a:spcAft>
-                      </a:pPr>
-                      <a:r>
-                        <a:rPr lang="hr-HR" sz="1800">
-                          <a:effectLst/>
-                        </a:rPr>
-                        <a:t>100</a:t>
-                      </a:r>
-                      <a:endParaRPr lang="hr-HR" sz="1800">
-                        <a:effectLst/>
-                        <a:latin typeface="Times New Roman" panose="02020603050405020304" pitchFamily="18" charset="0"/>
-                        <a:ea typeface="Times New Roman" panose="02020603050405020304" pitchFamily="18" charset="0"/>
-                      </a:endParaRPr>
-                    </a:p>
-                  </a:txBody>
-                  <a:tcPr marL="68580" marR="68580" marT="0" marB="0"/>
-                </a:tc>
-                <a:tc>
-                  <a:txBody>
-                    <a:bodyPr/>
-                    <a:lstStyle/>
-                    <a:p>
-                      <a:pPr algn="l">
-                        <a:lnSpc>
-                          <a:spcPct val="150000"/>
-                        </a:lnSpc>
-                        <a:spcBef>
-                          <a:spcPts val="600"/>
-                        </a:spcBef>
-                        <a:spcAft>
-                          <a:spcPts val="300"/>
-                        </a:spcAft>
-                      </a:pPr>
-                      <a:r>
-                        <a:rPr lang="hr-HR" sz="1800">
-                          <a:effectLst/>
-                        </a:rPr>
-                        <a:t>200</a:t>
-                      </a:r>
-                      <a:endParaRPr lang="hr-HR" sz="1800">
-                        <a:effectLst/>
-                        <a:latin typeface="Times New Roman" panose="02020603050405020304" pitchFamily="18" charset="0"/>
-                        <a:ea typeface="Times New Roman" panose="02020603050405020304" pitchFamily="18" charset="0"/>
-                      </a:endParaRPr>
-                    </a:p>
-                  </a:txBody>
-                  <a:tcPr marL="68580" marR="68580" marT="0" marB="0"/>
-                </a:tc>
-                <a:tc>
-                  <a:txBody>
-                    <a:bodyPr/>
-                    <a:lstStyle/>
-                    <a:p>
-                      <a:pPr algn="l">
-                        <a:lnSpc>
-                          <a:spcPct val="150000"/>
-                        </a:lnSpc>
-                        <a:spcBef>
-                          <a:spcPts val="600"/>
-                        </a:spcBef>
-                        <a:spcAft>
-                          <a:spcPts val="300"/>
-                        </a:spcAft>
-                      </a:pPr>
-                      <a:r>
-                        <a:rPr lang="hr-HR" sz="1800">
-                          <a:effectLst/>
-                        </a:rPr>
-                        <a:t>500</a:t>
-                      </a:r>
-                      <a:endParaRPr lang="hr-HR" sz="1800">
-                        <a:effectLst/>
-                        <a:latin typeface="Times New Roman" panose="02020603050405020304" pitchFamily="18" charset="0"/>
-                        <a:ea typeface="Times New Roman" panose="02020603050405020304" pitchFamily="18" charset="0"/>
-                      </a:endParaRPr>
-                    </a:p>
-                  </a:txBody>
-                  <a:tcPr marL="68580" marR="68580" marT="0" marB="0"/>
-                </a:tc>
-                <a:extLst>
-                  <a:ext uri="{0D108BD9-81ED-4DB2-BD59-A6C34878D82A}">
-                    <a16:rowId xmlns:a16="http://schemas.microsoft.com/office/drawing/2014/main" val="4159121970"/>
-                  </a:ext>
-                </a:extLst>
-              </a:tr>
-              <a:tr h="995669">
-                <a:tc>
-                  <a:txBody>
-                    <a:bodyPr/>
-                    <a:lstStyle/>
-                    <a:p>
-                      <a:pPr algn="l">
-                        <a:lnSpc>
-                          <a:spcPct val="150000"/>
-                        </a:lnSpc>
-                        <a:spcBef>
-                          <a:spcPts val="600"/>
-                        </a:spcBef>
-                        <a:spcAft>
-                          <a:spcPts val="300"/>
-                        </a:spcAft>
-                      </a:pPr>
-                      <a:r>
-                        <a:rPr lang="hr-HR" sz="1800">
-                          <a:effectLst/>
-                        </a:rPr>
-                        <a:t>Zauzeće memorije /MB</a:t>
-                      </a:r>
-                      <a:endParaRPr lang="hr-HR" sz="1800">
-                        <a:effectLst/>
-                        <a:latin typeface="Times New Roman" panose="02020603050405020304" pitchFamily="18" charset="0"/>
-                        <a:ea typeface="Times New Roman" panose="02020603050405020304" pitchFamily="18" charset="0"/>
-                      </a:endParaRPr>
-                    </a:p>
-                  </a:txBody>
-                  <a:tcPr marL="68580" marR="68580" marT="0" marB="0"/>
-                </a:tc>
-                <a:tc>
-                  <a:txBody>
-                    <a:bodyPr/>
-                    <a:lstStyle/>
-                    <a:p>
-                      <a:pPr algn="ctr">
-                        <a:lnSpc>
-                          <a:spcPct val="150000"/>
-                        </a:lnSpc>
-                        <a:spcBef>
-                          <a:spcPts val="600"/>
-                        </a:spcBef>
-                        <a:spcAft>
-                          <a:spcPts val="300"/>
-                        </a:spcAft>
-                      </a:pPr>
-                      <a:r>
-                        <a:rPr lang="hr-HR" sz="1800" dirty="0">
-                          <a:effectLst/>
-                        </a:rPr>
-                        <a:t>91.3143</a:t>
-                      </a:r>
-                      <a:endParaRPr lang="hr-HR" sz="1800" dirty="0">
-                        <a:effectLst/>
-                        <a:latin typeface="Times New Roman" panose="02020603050405020304" pitchFamily="18" charset="0"/>
-                        <a:ea typeface="Times New Roman" panose="02020603050405020304" pitchFamily="18" charset="0"/>
-                      </a:endParaRPr>
-                    </a:p>
-                  </a:txBody>
-                  <a:tcPr marL="68580" marR="68580" marT="0" marB="0" anchor="ctr"/>
-                </a:tc>
-                <a:tc>
-                  <a:txBody>
-                    <a:bodyPr/>
-                    <a:lstStyle/>
-                    <a:p>
-                      <a:pPr algn="ctr">
-                        <a:lnSpc>
-                          <a:spcPct val="150000"/>
-                        </a:lnSpc>
-                        <a:spcBef>
-                          <a:spcPts val="600"/>
-                        </a:spcBef>
-                        <a:spcAft>
-                          <a:spcPts val="300"/>
-                        </a:spcAft>
-                      </a:pPr>
-                      <a:r>
-                        <a:rPr lang="hr-HR" sz="1800">
-                          <a:effectLst/>
-                        </a:rPr>
-                        <a:t>332.594</a:t>
-                      </a:r>
-                      <a:endParaRPr lang="hr-HR" sz="1800">
-                        <a:effectLst/>
-                        <a:latin typeface="Times New Roman" panose="02020603050405020304" pitchFamily="18" charset="0"/>
-                        <a:ea typeface="Times New Roman" panose="02020603050405020304" pitchFamily="18" charset="0"/>
-                      </a:endParaRPr>
-                    </a:p>
-                  </a:txBody>
-                  <a:tcPr marL="68580" marR="68580" marT="0" marB="0" anchor="ctr"/>
-                </a:tc>
-                <a:tc>
-                  <a:txBody>
-                    <a:bodyPr/>
-                    <a:lstStyle/>
-                    <a:p>
-                      <a:pPr algn="ctr">
-                        <a:lnSpc>
-                          <a:spcPct val="150000"/>
-                        </a:lnSpc>
-                        <a:spcBef>
-                          <a:spcPts val="600"/>
-                        </a:spcBef>
-                        <a:spcAft>
-                          <a:spcPts val="300"/>
-                        </a:spcAft>
-                      </a:pPr>
-                      <a:r>
-                        <a:rPr lang="hr-HR" sz="1800">
-                          <a:effectLst/>
-                        </a:rPr>
-                        <a:t>332.594</a:t>
-                      </a:r>
-                      <a:endParaRPr lang="hr-HR" sz="1800">
-                        <a:effectLst/>
-                        <a:latin typeface="Times New Roman" panose="02020603050405020304" pitchFamily="18" charset="0"/>
-                        <a:ea typeface="Times New Roman" panose="02020603050405020304" pitchFamily="18" charset="0"/>
-                      </a:endParaRPr>
-                    </a:p>
-                  </a:txBody>
-                  <a:tcPr marL="68580" marR="68580" marT="0" marB="0" anchor="ctr"/>
-                </a:tc>
-                <a:tc>
-                  <a:txBody>
-                    <a:bodyPr/>
-                    <a:lstStyle/>
-                    <a:p>
-                      <a:pPr algn="ctr">
-                        <a:lnSpc>
-                          <a:spcPct val="150000"/>
-                        </a:lnSpc>
-                        <a:spcBef>
-                          <a:spcPts val="600"/>
-                        </a:spcBef>
-                        <a:spcAft>
-                          <a:spcPts val="300"/>
-                        </a:spcAft>
-                      </a:pPr>
-                      <a:r>
-                        <a:rPr lang="hr-HR" sz="1800">
-                          <a:effectLst/>
-                        </a:rPr>
-                        <a:t>332.594</a:t>
-                      </a:r>
-                      <a:endParaRPr lang="hr-HR" sz="1800">
-                        <a:effectLst/>
-                        <a:latin typeface="Times New Roman" panose="02020603050405020304" pitchFamily="18" charset="0"/>
-                        <a:ea typeface="Times New Roman" panose="02020603050405020304" pitchFamily="18" charset="0"/>
-                      </a:endParaRPr>
-                    </a:p>
-                  </a:txBody>
-                  <a:tcPr marL="68580" marR="68580" marT="0" marB="0" anchor="ctr"/>
-                </a:tc>
-                <a:tc>
-                  <a:txBody>
-                    <a:bodyPr/>
-                    <a:lstStyle/>
-                    <a:p>
-                      <a:pPr algn="ctr">
-                        <a:lnSpc>
-                          <a:spcPct val="150000"/>
-                        </a:lnSpc>
-                        <a:spcBef>
-                          <a:spcPts val="600"/>
-                        </a:spcBef>
-                        <a:spcAft>
-                          <a:spcPts val="300"/>
-                        </a:spcAft>
-                      </a:pPr>
-                      <a:r>
-                        <a:rPr lang="hr-HR" sz="1800">
-                          <a:effectLst/>
-                        </a:rPr>
-                        <a:t>332.594</a:t>
-                      </a:r>
-                      <a:endParaRPr lang="hr-HR" sz="1800">
-                        <a:effectLst/>
-                        <a:latin typeface="Times New Roman" panose="02020603050405020304" pitchFamily="18" charset="0"/>
-                        <a:ea typeface="Times New Roman" panose="02020603050405020304" pitchFamily="18" charset="0"/>
-                      </a:endParaRPr>
-                    </a:p>
-                  </a:txBody>
-                  <a:tcPr marL="68580" marR="68580" marT="0" marB="0" anchor="ctr"/>
-                </a:tc>
-                <a:tc>
-                  <a:txBody>
-                    <a:bodyPr/>
-                    <a:lstStyle/>
-                    <a:p>
-                      <a:pPr algn="ctr">
-                        <a:lnSpc>
-                          <a:spcPct val="150000"/>
-                        </a:lnSpc>
-                        <a:spcBef>
-                          <a:spcPts val="600"/>
-                        </a:spcBef>
-                        <a:spcAft>
-                          <a:spcPts val="300"/>
-                        </a:spcAft>
-                      </a:pPr>
-                      <a:r>
-                        <a:rPr lang="hr-HR" sz="1800" dirty="0">
-                          <a:effectLst/>
-                        </a:rPr>
-                        <a:t>332.594</a:t>
-                      </a:r>
-                      <a:endParaRPr lang="hr-HR" sz="1800" dirty="0">
-                        <a:effectLst/>
-                        <a:latin typeface="Times New Roman" panose="02020603050405020304" pitchFamily="18" charset="0"/>
-                        <a:ea typeface="Times New Roman" panose="02020603050405020304" pitchFamily="18" charset="0"/>
-                      </a:endParaRPr>
-                    </a:p>
-                  </a:txBody>
-                  <a:tcPr marL="68580" marR="68580" marT="0" marB="0" anchor="ctr"/>
-                </a:tc>
-                <a:extLst>
-                  <a:ext uri="{0D108BD9-81ED-4DB2-BD59-A6C34878D82A}">
-                    <a16:rowId xmlns:a16="http://schemas.microsoft.com/office/drawing/2014/main" val="3850853570"/>
-                  </a:ext>
-                </a:extLst>
-              </a:tr>
-            </a:tbl>
-          </a:graphicData>
-        </a:graphic>
-      </p:graphicFrame>
     </p:spTree>
     <p:extLst>
       <p:ext uri="{BB962C8B-B14F-4D97-AF65-F5344CB8AC3E}">
-        <p14:creationId xmlns:p14="http://schemas.microsoft.com/office/powerpoint/2010/main" val="1493154960"/>
+        <p14:creationId xmlns:p14="http://schemas.microsoft.com/office/powerpoint/2010/main" val="4044344100"/>
       </p:ext>
     </p:extLst>
   </p:cSld>
@@ -5275,7 +4365,7 @@
 </p:sld>
 </file>
 
-<file path=ppt/slides/slide13.xml><?xml version="1.0" encoding="utf-8"?>
+<file path=ppt/slides/slide15.xml><?xml version="1.0" encoding="utf-8"?>
 <p:sld xmlns:a="http://schemas.openxmlformats.org/drawingml/2006/main" xmlns:r="http://schemas.openxmlformats.org/officeDocument/2006/relationships" xmlns:p="http://schemas.openxmlformats.org/presentationml/2006/main">
   <p:cSld>
     <p:bg>
@@ -5484,7 +4574,7 @@
               </a:spcAft>
             </a:pPr>
             <a:r>
-              <a:rPr lang="hr-HR" sz="1494" kern="1200" err="1">
+              <a:rPr lang="hr-HR" sz="1494" kern="1200" dirty="0" err="1">
                 <a:solidFill>
                   <a:schemeClr val="tx1"/>
                 </a:solidFill>
@@ -5494,18 +4584,7 @@
               </a:rPr>
               <a:t>Cuckoo</a:t>
             </a:r>
-            <a:r>
-              <a:rPr lang="hr-HR" sz="1494" kern="1200">
-                <a:solidFill>
-                  <a:schemeClr val="tx1"/>
-                </a:solidFill>
-                <a:latin typeface="+mn-lt"/>
-                <a:ea typeface="+mn-ea"/>
-                <a:cs typeface="+mn-cs"/>
-              </a:rPr>
-              <a:t> (kukavica hrv.)</a:t>
-            </a:r>
-            <a:endParaRPr lang="hr-HR"/>
+            <a:endParaRPr lang="hr-HR" dirty="0"/>
           </a:p>
         </p:txBody>
       </p:sp>
@@ -6608,12 +5687,12 @@
                         </a:spcAft>
                       </a:pPr>
                       <a:r>
-                        <a:rPr lang="hr-HR" sz="2400">
+                        <a:rPr lang="hr-HR" sz="2400" dirty="0">
                           <a:effectLst/>
                         </a:rPr>
                         <a:t>927256</a:t>
                       </a:r>
-                      <a:endParaRPr lang="hr-HR" sz="2400">
+                      <a:endParaRPr lang="hr-HR" sz="2400" dirty="0">
                         <a:effectLst/>
                         <a:latin typeface="Times New Roman" panose="02020603050405020304" pitchFamily="18" charset="0"/>
                         <a:ea typeface="Times New Roman" panose="02020603050405020304" pitchFamily="18" charset="0"/>

</xml_diff>

<commit_message>
Male promijene u prezi
</commit_message>
<xml_diff>
--- a/docs/LDCF.pptx
+++ b/docs/LDCF.pptx
@@ -14,12 +14,14 @@
     <p:sldId id="271" r:id="rId8"/>
     <p:sldId id="264" r:id="rId9"/>
     <p:sldId id="265" r:id="rId10"/>
-    <p:sldId id="273" r:id="rId11"/>
-    <p:sldId id="274" r:id="rId12"/>
+    <p:sldId id="274" r:id="rId11"/>
+    <p:sldId id="267" r:id="rId12"/>
     <p:sldId id="275" r:id="rId13"/>
-    <p:sldId id="267" r:id="rId14"/>
-    <p:sldId id="276" r:id="rId15"/>
-    <p:sldId id="272" r:id="rId16"/>
+    <p:sldId id="280" r:id="rId14"/>
+    <p:sldId id="277" r:id="rId15"/>
+    <p:sldId id="279" r:id="rId16"/>
+    <p:sldId id="278" r:id="rId17"/>
+    <p:sldId id="272" r:id="rId18"/>
   </p:sldIdLst>
   <p:sldSz cx="12192000" cy="6858000"/>
   <p:notesSz cx="6858000" cy="9144000"/>
@@ -294,7 +296,7 @@
           <a:p>
             <a:fld id="{6B86F8C3-12C9-446C-A34D-B52FC9F7B8D1}" type="datetimeFigureOut">
               <a:rPr lang="hr-HR" smtClean="0"/>
-              <a:t>3.6.2023.</a:t>
+              <a:t>5.6.2023.</a:t>
             </a:fld>
             <a:endParaRPr lang="hr-HR"/>
           </a:p>
@@ -522,7 +524,7 @@
           <a:p>
             <a:fld id="{6B86F8C3-12C9-446C-A34D-B52FC9F7B8D1}" type="datetimeFigureOut">
               <a:rPr lang="hr-HR" smtClean="0"/>
-              <a:t>3.6.2023.</a:t>
+              <a:t>5.6.2023.</a:t>
             </a:fld>
             <a:endParaRPr lang="hr-HR"/>
           </a:p>
@@ -702,7 +704,7 @@
           <a:p>
             <a:fld id="{6B86F8C3-12C9-446C-A34D-B52FC9F7B8D1}" type="datetimeFigureOut">
               <a:rPr lang="hr-HR" smtClean="0"/>
-              <a:t>3.6.2023.</a:t>
+              <a:t>5.6.2023.</a:t>
             </a:fld>
             <a:endParaRPr lang="hr-HR"/>
           </a:p>
@@ -872,7 +874,7 @@
           <a:p>
             <a:fld id="{6B86F8C3-12C9-446C-A34D-B52FC9F7B8D1}" type="datetimeFigureOut">
               <a:rPr lang="hr-HR" smtClean="0"/>
-              <a:t>3.6.2023.</a:t>
+              <a:t>5.6.2023.</a:t>
             </a:fld>
             <a:endParaRPr lang="hr-HR"/>
           </a:p>
@@ -1126,7 +1128,7 @@
           <a:p>
             <a:fld id="{6B86F8C3-12C9-446C-A34D-B52FC9F7B8D1}" type="datetimeFigureOut">
               <a:rPr lang="hr-HR" smtClean="0"/>
-              <a:t>3.6.2023.</a:t>
+              <a:t>5.6.2023.</a:t>
             </a:fld>
             <a:endParaRPr lang="hr-HR"/>
           </a:p>
@@ -1452,7 +1454,7 @@
           <a:p>
             <a:fld id="{6B86F8C3-12C9-446C-A34D-B52FC9F7B8D1}" type="datetimeFigureOut">
               <a:rPr lang="hr-HR" smtClean="0"/>
-              <a:t>3.6.2023.</a:t>
+              <a:t>5.6.2023.</a:t>
             </a:fld>
             <a:endParaRPr lang="hr-HR"/>
           </a:p>
@@ -1903,7 +1905,7 @@
           <a:p>
             <a:fld id="{6B86F8C3-12C9-446C-A34D-B52FC9F7B8D1}" type="datetimeFigureOut">
               <a:rPr lang="hr-HR" smtClean="0"/>
-              <a:t>3.6.2023.</a:t>
+              <a:t>5.6.2023.</a:t>
             </a:fld>
             <a:endParaRPr lang="hr-HR"/>
           </a:p>
@@ -2021,7 +2023,7 @@
           <a:p>
             <a:fld id="{6B86F8C3-12C9-446C-A34D-B52FC9F7B8D1}" type="datetimeFigureOut">
               <a:rPr lang="hr-HR" smtClean="0"/>
-              <a:t>3.6.2023.</a:t>
+              <a:t>5.6.2023.</a:t>
             </a:fld>
             <a:endParaRPr lang="hr-HR"/>
           </a:p>
@@ -2116,7 +2118,7 @@
           <a:p>
             <a:fld id="{6B86F8C3-12C9-446C-A34D-B52FC9F7B8D1}" type="datetimeFigureOut">
               <a:rPr lang="hr-HR" smtClean="0"/>
-              <a:t>3.6.2023.</a:t>
+              <a:t>5.6.2023.</a:t>
             </a:fld>
             <a:endParaRPr lang="hr-HR"/>
           </a:p>
@@ -2403,7 +2405,7 @@
           <a:p>
             <a:fld id="{6B86F8C3-12C9-446C-A34D-B52FC9F7B8D1}" type="datetimeFigureOut">
               <a:rPr lang="hr-HR" smtClean="0"/>
-              <a:t>3.6.2023.</a:t>
+              <a:t>5.6.2023.</a:t>
             </a:fld>
             <a:endParaRPr lang="hr-HR"/>
           </a:p>
@@ -2725,7 +2727,7 @@
           <a:p>
             <a:fld id="{6B86F8C3-12C9-446C-A34D-B52FC9F7B8D1}" type="datetimeFigureOut">
               <a:rPr lang="hr-HR" smtClean="0"/>
-              <a:t>3.6.2023.</a:t>
+              <a:t>5.6.2023.</a:t>
             </a:fld>
             <a:endParaRPr lang="hr-HR"/>
           </a:p>
@@ -2979,7 +2981,7 @@
           <a:p>
             <a:fld id="{6B86F8C3-12C9-446C-A34D-B52FC9F7B8D1}" type="datetimeFigureOut">
               <a:rPr lang="hr-HR" smtClean="0"/>
-              <a:t>3.6.2023.</a:t>
+              <a:t>5.6.2023.</a:t>
             </a:fld>
             <a:endParaRPr lang="hr-HR"/>
           </a:p>
@@ -3603,139 +3605,32 @@
       </p:grpSpPr>
       <p:pic>
         <p:nvPicPr>
-          <p:cNvPr id="1028" name="Picture 4">
+          <p:cNvPr id="3" name="Picture 2">
             <a:extLst>
               <a:ext uri="{FF2B5EF4-FFF2-40B4-BE49-F238E27FC236}">
-                <a16:creationId xmlns:a16="http://schemas.microsoft.com/office/drawing/2014/main" id="{6459F599-F7AE-9BBF-CB41-7E09F242C477}"/>
+                <a16:creationId xmlns:a16="http://schemas.microsoft.com/office/drawing/2014/main" id="{414118AF-61BD-E616-F9D7-3063B7298FFB}"/>
               </a:ext>
             </a:extLst>
           </p:cNvPr>
           <p:cNvPicPr>
-            <a:picLocks noChangeAspect="1" noChangeArrowheads="1"/>
+            <a:picLocks noChangeAspect="1"/>
           </p:cNvPicPr>
           <p:nvPr/>
         </p:nvPicPr>
         <p:blipFill>
-          <a:blip r:embed="rId2">
-            <a:extLst>
-              <a:ext uri="{28A0092B-C50C-407E-A947-70E740481C1C}">
-                <a14:useLocalDpi xmlns:a14="http://schemas.microsoft.com/office/drawing/2010/main" val="0"/>
-              </a:ext>
-            </a:extLst>
-          </a:blip>
-          <a:srcRect/>
+          <a:blip r:embed="rId2"/>
           <a:stretch>
             <a:fillRect/>
           </a:stretch>
         </p:blipFill>
-        <p:spPr bwMode="auto">
+        <p:spPr>
           <a:xfrm>
-            <a:off x="2162054" y="390043"/>
-            <a:ext cx="7867892" cy="6077913"/>
+            <a:off x="1790700" y="619125"/>
+            <a:ext cx="8610600" cy="5619750"/>
           </a:xfrm>
           <a:prstGeom prst="rect">
             <a:avLst/>
           </a:prstGeom>
-          <a:noFill/>
-          <a:extLst>
-            <a:ext uri="{909E8E84-426E-40DD-AFC4-6F175D3DCCD1}">
-              <a14:hiddenFill xmlns:a14="http://schemas.microsoft.com/office/drawing/2010/main">
-                <a:solidFill>
-                  <a:srgbClr val="FFFFFF"/>
-                </a:solidFill>
-              </a14:hiddenFill>
-            </a:ext>
-          </a:extLst>
-        </p:spPr>
-      </p:pic>
-    </p:spTree>
-    <p:extLst>
-      <p:ext uri="{BB962C8B-B14F-4D97-AF65-F5344CB8AC3E}">
-        <p14:creationId xmlns:p14="http://schemas.microsoft.com/office/powerpoint/2010/main" val="1644022956"/>
-      </p:ext>
-    </p:extLst>
-  </p:cSld>
-  <p:clrMapOvr>
-    <a:masterClrMapping/>
-  </p:clrMapOvr>
-</p:sld>
-</file>
-
-<file path=ppt/slides/slide11.xml><?xml version="1.0" encoding="utf-8"?>
-<p:sld xmlns:a="http://schemas.openxmlformats.org/drawingml/2006/main" xmlns:r="http://schemas.openxmlformats.org/officeDocument/2006/relationships" xmlns:p="http://schemas.openxmlformats.org/presentationml/2006/main">
-  <p:cSld>
-    <p:spTree>
-      <p:nvGrpSpPr>
-        <p:cNvPr id="1" name=""/>
-        <p:cNvGrpSpPr/>
-        <p:nvPr/>
-      </p:nvGrpSpPr>
-      <p:grpSpPr>
-        <a:xfrm>
-          <a:off x="0" y="0"/>
-          <a:ext cx="0" cy="0"/>
-          <a:chOff x="0" y="0"/>
-          <a:chExt cx="0" cy="0"/>
-        </a:xfrm>
-      </p:grpSpPr>
-      <p:pic>
-        <p:nvPicPr>
-          <p:cNvPr id="2050" name="Picture 2">
-            <a:extLst>
-              <a:ext uri="{FF2B5EF4-FFF2-40B4-BE49-F238E27FC236}">
-                <a16:creationId xmlns:a16="http://schemas.microsoft.com/office/drawing/2014/main" id="{B2DBCC2F-E294-A9CB-3D1E-804439E5BCAA}"/>
-              </a:ext>
-            </a:extLst>
-          </p:cNvPr>
-          <p:cNvPicPr>
-            <a:picLocks noChangeAspect="1" noChangeArrowheads="1"/>
-          </p:cNvPicPr>
-          <p:nvPr/>
-        </p:nvPicPr>
-        <p:blipFill>
-          <a:blip r:embed="rId2">
-            <a:extLst>
-              <a:ext uri="{28A0092B-C50C-407E-A947-70E740481C1C}">
-                <a14:useLocalDpi xmlns:a14="http://schemas.microsoft.com/office/drawing/2010/main" val="0"/>
-              </a:ext>
-            </a:extLst>
-          </a:blip>
-          <a:srcRect/>
-          <a:stretch>
-            <a:fillRect/>
-          </a:stretch>
-        </p:blipFill>
-        <p:spPr bwMode="auto">
-          <a:xfrm>
-            <a:off x="2079018" y="317361"/>
-            <a:ext cx="8033963" cy="6223278"/>
-          </a:xfrm>
-          <a:prstGeom prst="rect">
-            <a:avLst/>
-          </a:prstGeom>
-          <a:noFill/>
-          <a:ln>
-            <a:noFill/>
-          </a:ln>
-          <a:extLst>
-            <a:ext uri="{909E8E84-426E-40DD-AFC4-6F175D3DCCD1}">
-              <a14:hiddenFill xmlns:a14="http://schemas.microsoft.com/office/drawing/2010/main">
-                <a:solidFill>
-                  <a:srgbClr val="FFFFFF"/>
-                </a:solidFill>
-              </a14:hiddenFill>
-            </a:ext>
-            <a:ext uri="{91240B29-F687-4F45-9708-019B960494DF}">
-              <a14:hiddenLine xmlns:a14="http://schemas.microsoft.com/office/drawing/2010/main" w="9525">
-                <a:solidFill>
-                  <a:srgbClr val="000000"/>
-                </a:solidFill>
-                <a:miter lim="800000"/>
-                <a:headEnd/>
-                <a:tailEnd/>
-              </a14:hiddenLine>
-            </a:ext>
-          </a:extLst>
         </p:spPr>
       </p:pic>
     </p:spTree>
@@ -3751,97 +3646,7 @@
 </p:sld>
 </file>
 
-<file path=ppt/slides/slide12.xml><?xml version="1.0" encoding="utf-8"?>
-<p:sld xmlns:a="http://schemas.openxmlformats.org/drawingml/2006/main" xmlns:r="http://schemas.openxmlformats.org/officeDocument/2006/relationships" xmlns:p="http://schemas.openxmlformats.org/presentationml/2006/main">
-  <p:cSld>
-    <p:spTree>
-      <p:nvGrpSpPr>
-        <p:cNvPr id="1" name=""/>
-        <p:cNvGrpSpPr/>
-        <p:nvPr/>
-      </p:nvGrpSpPr>
-      <p:grpSpPr>
-        <a:xfrm>
-          <a:off x="0" y="0"/>
-          <a:ext cx="0" cy="0"/>
-          <a:chOff x="0" y="0"/>
-          <a:chExt cx="0" cy="0"/>
-        </a:xfrm>
-      </p:grpSpPr>
-      <p:pic>
-        <p:nvPicPr>
-          <p:cNvPr id="3074" name="Picture 2">
-            <a:extLst>
-              <a:ext uri="{FF2B5EF4-FFF2-40B4-BE49-F238E27FC236}">
-                <a16:creationId xmlns:a16="http://schemas.microsoft.com/office/drawing/2014/main" id="{2E68D57B-C0C0-5D65-DDB6-711B44372988}"/>
-              </a:ext>
-            </a:extLst>
-          </p:cNvPr>
-          <p:cNvPicPr>
-            <a:picLocks noChangeAspect="1" noChangeArrowheads="1"/>
-          </p:cNvPicPr>
-          <p:nvPr/>
-        </p:nvPicPr>
-        <p:blipFill>
-          <a:blip r:embed="rId2">
-            <a:extLst>
-              <a:ext uri="{28A0092B-C50C-407E-A947-70E740481C1C}">
-                <a14:useLocalDpi xmlns:a14="http://schemas.microsoft.com/office/drawing/2010/main" val="0"/>
-              </a:ext>
-            </a:extLst>
-          </a:blip>
-          <a:srcRect/>
-          <a:stretch>
-            <a:fillRect/>
-          </a:stretch>
-        </p:blipFill>
-        <p:spPr bwMode="auto">
-          <a:xfrm>
-            <a:off x="2335928" y="518662"/>
-            <a:ext cx="7520143" cy="5820676"/>
-          </a:xfrm>
-          <a:prstGeom prst="rect">
-            <a:avLst/>
-          </a:prstGeom>
-          <a:noFill/>
-          <a:ln>
-            <a:noFill/>
-          </a:ln>
-          <a:extLst>
-            <a:ext uri="{909E8E84-426E-40DD-AFC4-6F175D3DCCD1}">
-              <a14:hiddenFill xmlns:a14="http://schemas.microsoft.com/office/drawing/2010/main">
-                <a:solidFill>
-                  <a:srgbClr val="FFFFFF"/>
-                </a:solidFill>
-              </a14:hiddenFill>
-            </a:ext>
-            <a:ext uri="{91240B29-F687-4F45-9708-019B960494DF}">
-              <a14:hiddenLine xmlns:a14="http://schemas.microsoft.com/office/drawing/2010/main" w="9525">
-                <a:solidFill>
-                  <a:srgbClr val="000000"/>
-                </a:solidFill>
-                <a:miter lim="800000"/>
-                <a:headEnd/>
-                <a:tailEnd/>
-              </a14:hiddenLine>
-            </a:ext>
-          </a:extLst>
-        </p:spPr>
-      </p:pic>
-    </p:spTree>
-    <p:extLst>
-      <p:ext uri="{BB962C8B-B14F-4D97-AF65-F5344CB8AC3E}">
-        <p14:creationId xmlns:p14="http://schemas.microsoft.com/office/powerpoint/2010/main" val="3423868026"/>
-      </p:ext>
-    </p:extLst>
-  </p:cSld>
-  <p:clrMapOvr>
-    <a:masterClrMapping/>
-  </p:clrMapOvr>
-</p:sld>
-</file>
-
-<file path=ppt/slides/slide13.xml><?xml version="1.0" encoding="utf-8"?>
+<file path=ppt/slides/slide11.xml><?xml version="1.0" encoding="utf-8"?>
 <p:sld xmlns:a="http://schemas.openxmlformats.org/drawingml/2006/main" xmlns:r="http://schemas.openxmlformats.org/officeDocument/2006/relationships" xmlns:p="http://schemas.openxmlformats.org/presentationml/2006/main">
   <p:cSld>
     <p:bg>
@@ -4288,6 +4093,126 @@
 </p:sld>
 </file>
 
+<file path=ppt/slides/slide12.xml><?xml version="1.0" encoding="utf-8"?>
+<p:sld xmlns:a="http://schemas.openxmlformats.org/drawingml/2006/main" xmlns:r="http://schemas.openxmlformats.org/officeDocument/2006/relationships" xmlns:p="http://schemas.openxmlformats.org/presentationml/2006/main">
+  <p:cSld>
+    <p:spTree>
+      <p:nvGrpSpPr>
+        <p:cNvPr id="1" name=""/>
+        <p:cNvGrpSpPr/>
+        <p:nvPr/>
+      </p:nvGrpSpPr>
+      <p:grpSpPr>
+        <a:xfrm>
+          <a:off x="0" y="0"/>
+          <a:ext cx="0" cy="0"/>
+          <a:chOff x="0" y="0"/>
+          <a:chExt cx="0" cy="0"/>
+        </a:xfrm>
+      </p:grpSpPr>
+      <p:pic>
+        <p:nvPicPr>
+          <p:cNvPr id="7" name="Picture 6">
+            <a:extLst>
+              <a:ext uri="{FF2B5EF4-FFF2-40B4-BE49-F238E27FC236}">
+                <a16:creationId xmlns:a16="http://schemas.microsoft.com/office/drawing/2014/main" id="{E4D3041D-A408-D89A-29B7-7BC8437AC590}"/>
+              </a:ext>
+            </a:extLst>
+          </p:cNvPr>
+          <p:cNvPicPr>
+            <a:picLocks noChangeAspect="1"/>
+          </p:cNvPicPr>
+          <p:nvPr/>
+        </p:nvPicPr>
+        <p:blipFill>
+          <a:blip r:embed="rId2"/>
+          <a:stretch>
+            <a:fillRect/>
+          </a:stretch>
+        </p:blipFill>
+        <p:spPr>
+          <a:xfrm>
+            <a:off x="1895475" y="619125"/>
+            <a:ext cx="8401050" cy="5619750"/>
+          </a:xfrm>
+          <a:prstGeom prst="rect">
+            <a:avLst/>
+          </a:prstGeom>
+        </p:spPr>
+      </p:pic>
+    </p:spTree>
+    <p:extLst>
+      <p:ext uri="{BB962C8B-B14F-4D97-AF65-F5344CB8AC3E}">
+        <p14:creationId xmlns:p14="http://schemas.microsoft.com/office/powerpoint/2010/main" val="3423868026"/>
+      </p:ext>
+    </p:extLst>
+  </p:cSld>
+  <p:clrMapOvr>
+    <a:masterClrMapping/>
+  </p:clrMapOvr>
+</p:sld>
+</file>
+
+<file path=ppt/slides/slide13.xml><?xml version="1.0" encoding="utf-8"?>
+<p:sld xmlns:a="http://schemas.openxmlformats.org/drawingml/2006/main" xmlns:r="http://schemas.openxmlformats.org/officeDocument/2006/relationships" xmlns:p="http://schemas.openxmlformats.org/presentationml/2006/main">
+  <p:cSld>
+    <p:spTree>
+      <p:nvGrpSpPr>
+        <p:cNvPr id="1" name=""/>
+        <p:cNvGrpSpPr/>
+        <p:nvPr/>
+      </p:nvGrpSpPr>
+      <p:grpSpPr>
+        <a:xfrm>
+          <a:off x="0" y="0"/>
+          <a:ext cx="0" cy="0"/>
+          <a:chOff x="0" y="0"/>
+          <a:chExt cx="0" cy="0"/>
+        </a:xfrm>
+      </p:grpSpPr>
+      <p:pic>
+        <p:nvPicPr>
+          <p:cNvPr id="3" name="Picture 2">
+            <a:extLst>
+              <a:ext uri="{FF2B5EF4-FFF2-40B4-BE49-F238E27FC236}">
+                <a16:creationId xmlns:a16="http://schemas.microsoft.com/office/drawing/2014/main" id="{8B195F02-1F79-1E8E-A412-13BCE64099D8}"/>
+              </a:ext>
+            </a:extLst>
+          </p:cNvPr>
+          <p:cNvPicPr>
+            <a:picLocks noChangeAspect="1"/>
+          </p:cNvPicPr>
+          <p:nvPr/>
+        </p:nvPicPr>
+        <p:blipFill>
+          <a:blip r:embed="rId2"/>
+          <a:stretch>
+            <a:fillRect/>
+          </a:stretch>
+        </p:blipFill>
+        <p:spPr>
+          <a:xfrm>
+            <a:off x="1866900" y="509587"/>
+            <a:ext cx="8458200" cy="5838825"/>
+          </a:xfrm>
+          <a:prstGeom prst="rect">
+            <a:avLst/>
+          </a:prstGeom>
+        </p:spPr>
+      </p:pic>
+    </p:spTree>
+    <p:extLst>
+      <p:ext uri="{BB962C8B-B14F-4D97-AF65-F5344CB8AC3E}">
+        <p14:creationId xmlns:p14="http://schemas.microsoft.com/office/powerpoint/2010/main" val="4194743562"/>
+      </p:ext>
+    </p:extLst>
+  </p:cSld>
+  <p:clrMapOvr>
+    <a:masterClrMapping/>
+  </p:clrMapOvr>
+</p:sld>
+</file>
+
 <file path=ppt/slides/slide14.xml><?xml version="1.0" encoding="utf-8"?>
 <p:sld xmlns:a="http://schemas.openxmlformats.org/drawingml/2006/main" xmlns:r="http://schemas.openxmlformats.org/officeDocument/2006/relationships" xmlns:p="http://schemas.openxmlformats.org/presentationml/2006/main">
   <p:cSld>
@@ -4307,55 +4232,38 @@
       </p:grpSpPr>
       <p:pic>
         <p:nvPicPr>
-          <p:cNvPr id="4098" name="Picture 2">
+          <p:cNvPr id="3" name="Picture 2">
             <a:extLst>
               <a:ext uri="{FF2B5EF4-FFF2-40B4-BE49-F238E27FC236}">
-                <a16:creationId xmlns:a16="http://schemas.microsoft.com/office/drawing/2014/main" id="{36FA5AB2-BDB5-C03B-B167-C0DFDC3ED476}"/>
+                <a16:creationId xmlns:a16="http://schemas.microsoft.com/office/drawing/2014/main" id="{036A9F25-E2A7-7DAA-2A03-344BC789E5E6}"/>
               </a:ext>
             </a:extLst>
           </p:cNvPr>
           <p:cNvPicPr>
-            <a:picLocks noChangeAspect="1" noChangeArrowheads="1"/>
+            <a:picLocks noChangeAspect="1"/>
           </p:cNvPicPr>
           <p:nvPr/>
         </p:nvPicPr>
         <p:blipFill>
-          <a:blip r:embed="rId2">
-            <a:extLst>
-              <a:ext uri="{28A0092B-C50C-407E-A947-70E740481C1C}">
-                <a14:useLocalDpi xmlns:a14="http://schemas.microsoft.com/office/drawing/2010/main" val="0"/>
-              </a:ext>
-            </a:extLst>
-          </a:blip>
-          <a:srcRect/>
+          <a:blip r:embed="rId2"/>
           <a:stretch>
             <a:fillRect/>
           </a:stretch>
         </p:blipFill>
-        <p:spPr bwMode="auto">
+        <p:spPr>
           <a:xfrm>
-            <a:off x="2085349" y="277280"/>
-            <a:ext cx="8021301" cy="6303440"/>
+            <a:off x="1847850" y="619125"/>
+            <a:ext cx="8496300" cy="5619750"/>
           </a:xfrm>
           <a:prstGeom prst="rect">
             <a:avLst/>
           </a:prstGeom>
-          <a:noFill/>
-          <a:extLst>
-            <a:ext uri="{909E8E84-426E-40DD-AFC4-6F175D3DCCD1}">
-              <a14:hiddenFill xmlns:a14="http://schemas.microsoft.com/office/drawing/2010/main">
-                <a:solidFill>
-                  <a:srgbClr val="FFFFFF"/>
-                </a:solidFill>
-              </a14:hiddenFill>
-            </a:ext>
-          </a:extLst>
         </p:spPr>
       </p:pic>
     </p:spTree>
     <p:extLst>
       <p:ext uri="{BB962C8B-B14F-4D97-AF65-F5344CB8AC3E}">
-        <p14:creationId xmlns:p14="http://schemas.microsoft.com/office/powerpoint/2010/main" val="4044344100"/>
+        <p14:creationId xmlns:p14="http://schemas.microsoft.com/office/powerpoint/2010/main" val="632013805"/>
       </p:ext>
     </p:extLst>
   </p:cSld>
@@ -4366,6 +4274,126 @@
 </file>
 
 <file path=ppt/slides/slide15.xml><?xml version="1.0" encoding="utf-8"?>
+<p:sld xmlns:a="http://schemas.openxmlformats.org/drawingml/2006/main" xmlns:r="http://schemas.openxmlformats.org/officeDocument/2006/relationships" xmlns:p="http://schemas.openxmlformats.org/presentationml/2006/main">
+  <p:cSld>
+    <p:spTree>
+      <p:nvGrpSpPr>
+        <p:cNvPr id="1" name=""/>
+        <p:cNvGrpSpPr/>
+        <p:nvPr/>
+      </p:nvGrpSpPr>
+      <p:grpSpPr>
+        <a:xfrm>
+          <a:off x="0" y="0"/>
+          <a:ext cx="0" cy="0"/>
+          <a:chOff x="0" y="0"/>
+          <a:chExt cx="0" cy="0"/>
+        </a:xfrm>
+      </p:grpSpPr>
+      <p:pic>
+        <p:nvPicPr>
+          <p:cNvPr id="3" name="Picture 2">
+            <a:extLst>
+              <a:ext uri="{FF2B5EF4-FFF2-40B4-BE49-F238E27FC236}">
+                <a16:creationId xmlns:a16="http://schemas.microsoft.com/office/drawing/2014/main" id="{279768DB-1A60-9F3E-B798-11D984CC0629}"/>
+              </a:ext>
+            </a:extLst>
+          </p:cNvPr>
+          <p:cNvPicPr>
+            <a:picLocks noChangeAspect="1"/>
+          </p:cNvPicPr>
+          <p:nvPr/>
+        </p:nvPicPr>
+        <p:blipFill>
+          <a:blip r:embed="rId2"/>
+          <a:stretch>
+            <a:fillRect/>
+          </a:stretch>
+        </p:blipFill>
+        <p:spPr>
+          <a:xfrm>
+            <a:off x="2005012" y="566737"/>
+            <a:ext cx="8181975" cy="5724525"/>
+          </a:xfrm>
+          <a:prstGeom prst="rect">
+            <a:avLst/>
+          </a:prstGeom>
+        </p:spPr>
+      </p:pic>
+    </p:spTree>
+    <p:extLst>
+      <p:ext uri="{BB962C8B-B14F-4D97-AF65-F5344CB8AC3E}">
+        <p14:creationId xmlns:p14="http://schemas.microsoft.com/office/powerpoint/2010/main" val="3597780707"/>
+      </p:ext>
+    </p:extLst>
+  </p:cSld>
+  <p:clrMapOvr>
+    <a:masterClrMapping/>
+  </p:clrMapOvr>
+</p:sld>
+</file>
+
+<file path=ppt/slides/slide16.xml><?xml version="1.0" encoding="utf-8"?>
+<p:sld xmlns:a="http://schemas.openxmlformats.org/drawingml/2006/main" xmlns:r="http://schemas.openxmlformats.org/officeDocument/2006/relationships" xmlns:p="http://schemas.openxmlformats.org/presentationml/2006/main">
+  <p:cSld>
+    <p:spTree>
+      <p:nvGrpSpPr>
+        <p:cNvPr id="1" name=""/>
+        <p:cNvGrpSpPr/>
+        <p:nvPr/>
+      </p:nvGrpSpPr>
+      <p:grpSpPr>
+        <a:xfrm>
+          <a:off x="0" y="0"/>
+          <a:ext cx="0" cy="0"/>
+          <a:chOff x="0" y="0"/>
+          <a:chExt cx="0" cy="0"/>
+        </a:xfrm>
+      </p:grpSpPr>
+      <p:pic>
+        <p:nvPicPr>
+          <p:cNvPr id="3" name="Picture 2">
+            <a:extLst>
+              <a:ext uri="{FF2B5EF4-FFF2-40B4-BE49-F238E27FC236}">
+                <a16:creationId xmlns:a16="http://schemas.microsoft.com/office/drawing/2014/main" id="{D6EFB491-617E-D261-ABDD-9ADBE364D048}"/>
+              </a:ext>
+            </a:extLst>
+          </p:cNvPr>
+          <p:cNvPicPr>
+            <a:picLocks noChangeAspect="1"/>
+          </p:cNvPicPr>
+          <p:nvPr/>
+        </p:nvPicPr>
+        <p:blipFill>
+          <a:blip r:embed="rId2"/>
+          <a:stretch>
+            <a:fillRect/>
+          </a:stretch>
+        </p:blipFill>
+        <p:spPr>
+          <a:xfrm>
+            <a:off x="1871662" y="557212"/>
+            <a:ext cx="8448675" cy="5743575"/>
+          </a:xfrm>
+          <a:prstGeom prst="rect">
+            <a:avLst/>
+          </a:prstGeom>
+        </p:spPr>
+      </p:pic>
+    </p:spTree>
+    <p:extLst>
+      <p:ext uri="{BB962C8B-B14F-4D97-AF65-F5344CB8AC3E}">
+        <p14:creationId xmlns:p14="http://schemas.microsoft.com/office/powerpoint/2010/main" val="1632284058"/>
+      </p:ext>
+    </p:extLst>
+  </p:cSld>
+  <p:clrMapOvr>
+    <a:masterClrMapping/>
+  </p:clrMapOvr>
+</p:sld>
+</file>
+
+<file path=ppt/slides/slide17.xml><?xml version="1.0" encoding="utf-8"?>
 <p:sld xmlns:a="http://schemas.openxmlformats.org/drawingml/2006/main" xmlns:r="http://schemas.openxmlformats.org/officeDocument/2006/relationships" xmlns:p="http://schemas.openxmlformats.org/presentationml/2006/main">
   <p:cSld>
     <p:bg>

</xml_diff>